<commit_message>
minor lecture review updates
</commit_message>
<xml_diff>
--- a/review/lecture-review-week-5.pptx
+++ b/review/lecture-review-week-5.pptx
@@ -9,10 +9,9 @@
     <p:sldId id="260" r:id="rId3"/>
     <p:sldId id="259" r:id="rId4"/>
     <p:sldId id="279" r:id="rId5"/>
-    <p:sldId id="280" r:id="rId6"/>
-    <p:sldId id="281" r:id="rId7"/>
+    <p:sldId id="281" r:id="rId6"/>
+    <p:sldId id="278" r:id="rId7"/>
     <p:sldId id="271" r:id="rId8"/>
-    <p:sldId id="278" r:id="rId9"/>
   </p:sldIdLst>
   <p:sldSz cx="12192000" cy="6858000"/>
   <p:notesSz cx="6858000" cy="9144000"/>
@@ -266,7 +265,7 @@
           <a:p>
             <a:fld id="{2EB47A83-2598-B342-BA52-F01C23A2EBB5}" type="datetimeFigureOut">
               <a:rPr lang="en-US" smtClean="0"/>
-              <a:t>8/9/19</a:t>
+              <a:t>10/5/19</a:t>
             </a:fld>
             <a:endParaRPr lang="en-US"/>
           </a:p>
@@ -464,7 +463,7 @@
           <a:p>
             <a:fld id="{2EB47A83-2598-B342-BA52-F01C23A2EBB5}" type="datetimeFigureOut">
               <a:rPr lang="en-US" smtClean="0"/>
-              <a:t>8/9/19</a:t>
+              <a:t>10/5/19</a:t>
             </a:fld>
             <a:endParaRPr lang="en-US"/>
           </a:p>
@@ -672,7 +671,7 @@
           <a:p>
             <a:fld id="{2EB47A83-2598-B342-BA52-F01C23A2EBB5}" type="datetimeFigureOut">
               <a:rPr lang="en-US" smtClean="0"/>
-              <a:t>8/9/19</a:t>
+              <a:t>10/5/19</a:t>
             </a:fld>
             <a:endParaRPr lang="en-US"/>
           </a:p>
@@ -870,7 +869,7 @@
           <a:p>
             <a:fld id="{2EB47A83-2598-B342-BA52-F01C23A2EBB5}" type="datetimeFigureOut">
               <a:rPr lang="en-US" smtClean="0"/>
-              <a:t>8/9/19</a:t>
+              <a:t>10/5/19</a:t>
             </a:fld>
             <a:endParaRPr lang="en-US"/>
           </a:p>
@@ -1145,7 +1144,7 @@
           <a:p>
             <a:fld id="{2EB47A83-2598-B342-BA52-F01C23A2EBB5}" type="datetimeFigureOut">
               <a:rPr lang="en-US" smtClean="0"/>
-              <a:t>8/9/19</a:t>
+              <a:t>10/5/19</a:t>
             </a:fld>
             <a:endParaRPr lang="en-US"/>
           </a:p>
@@ -1410,7 +1409,7 @@
           <a:p>
             <a:fld id="{2EB47A83-2598-B342-BA52-F01C23A2EBB5}" type="datetimeFigureOut">
               <a:rPr lang="en-US" smtClean="0"/>
-              <a:t>8/9/19</a:t>
+              <a:t>10/5/19</a:t>
             </a:fld>
             <a:endParaRPr lang="en-US"/>
           </a:p>
@@ -1822,7 +1821,7 @@
           <a:p>
             <a:fld id="{2EB47A83-2598-B342-BA52-F01C23A2EBB5}" type="datetimeFigureOut">
               <a:rPr lang="en-US" smtClean="0"/>
-              <a:t>8/9/19</a:t>
+              <a:t>10/5/19</a:t>
             </a:fld>
             <a:endParaRPr lang="en-US"/>
           </a:p>
@@ -1963,7 +1962,7 @@
           <a:p>
             <a:fld id="{2EB47A83-2598-B342-BA52-F01C23A2EBB5}" type="datetimeFigureOut">
               <a:rPr lang="en-US" smtClean="0"/>
-              <a:t>8/9/19</a:t>
+              <a:t>10/5/19</a:t>
             </a:fld>
             <a:endParaRPr lang="en-US"/>
           </a:p>
@@ -2076,7 +2075,7 @@
           <a:p>
             <a:fld id="{2EB47A83-2598-B342-BA52-F01C23A2EBB5}" type="datetimeFigureOut">
               <a:rPr lang="en-US" smtClean="0"/>
-              <a:t>8/9/19</a:t>
+              <a:t>10/5/19</a:t>
             </a:fld>
             <a:endParaRPr lang="en-US"/>
           </a:p>
@@ -2387,7 +2386,7 @@
           <a:p>
             <a:fld id="{2EB47A83-2598-B342-BA52-F01C23A2EBB5}" type="datetimeFigureOut">
               <a:rPr lang="en-US" smtClean="0"/>
-              <a:t>8/9/19</a:t>
+              <a:t>10/5/19</a:t>
             </a:fld>
             <a:endParaRPr lang="en-US"/>
           </a:p>
@@ -2675,7 +2674,7 @@
           <a:p>
             <a:fld id="{2EB47A83-2598-B342-BA52-F01C23A2EBB5}" type="datetimeFigureOut">
               <a:rPr lang="en-US" smtClean="0"/>
-              <a:t>8/9/19</a:t>
+              <a:t>10/5/19</a:t>
             </a:fld>
             <a:endParaRPr lang="en-US"/>
           </a:p>
@@ -2916,7 +2915,7 @@
           <a:p>
             <a:fld id="{2EB47A83-2598-B342-BA52-F01C23A2EBB5}" type="datetimeFigureOut">
               <a:rPr lang="en-US" smtClean="0"/>
-              <a:t>8/9/19</a:t>
+              <a:t>10/5/19</a:t>
             </a:fld>
             <a:endParaRPr lang="en-US"/>
           </a:p>
@@ -3548,12 +3547,6 @@
           <a:p>
             <a:r>
               <a:rPr lang="en-US" dirty="0"/>
-              <a:t>CloudFormation Introduction</a:t>
-            </a:r>
-          </a:p>
-          <a:p>
-            <a:r>
-              <a:rPr lang="en-US" dirty="0"/>
               <a:t>Understanding S3 addresses</a:t>
             </a:r>
           </a:p>
@@ -3923,7 +3916,7 @@
           <p:cNvPr id="2" name="Title 1">
             <a:extLst>
               <a:ext uri="{FF2B5EF4-FFF2-40B4-BE49-F238E27FC236}">
-                <a16:creationId xmlns:a16="http://schemas.microsoft.com/office/drawing/2014/main" id="{68405C50-CF5B-914E-B5D3-22224EC0D2A5}"/>
+                <a16:creationId xmlns:a16="http://schemas.microsoft.com/office/drawing/2014/main" id="{6FF27851-F3E4-754E-A39D-B0BB9A3EF0DD}"/>
               </a:ext>
             </a:extLst>
           </p:cNvPr>
@@ -3941,7 +3934,7 @@
           <a:p>
             <a:r>
               <a:rPr lang="en-US" dirty="0"/>
-              <a:t>CloudFormation</a:t>
+              <a:t>Understanding S3 addresses</a:t>
             </a:r>
           </a:p>
         </p:txBody>
@@ -3951,7 +3944,7 @@
           <p:cNvPr id="3" name="Content Placeholder 2">
             <a:extLst>
               <a:ext uri="{FF2B5EF4-FFF2-40B4-BE49-F238E27FC236}">
-                <a16:creationId xmlns:a16="http://schemas.microsoft.com/office/drawing/2014/main" id="{76D485F2-671F-5A42-B0E7-918505826E27}"/>
+                <a16:creationId xmlns:a16="http://schemas.microsoft.com/office/drawing/2014/main" id="{EC802898-5B8C-C44B-9BC8-2BDAA6BA2C01}"/>
               </a:ext>
             </a:extLst>
           </p:cNvPr>
@@ -3965,27 +3958,73 @@
         <p:spPr/>
         <p:txBody>
           <a:bodyPr>
-            <a:normAutofit fontScale="62500" lnSpcReduction="20000"/>
+            <a:normAutofit lnSpcReduction="10000"/>
           </a:bodyPr>
           <a:lstStyle/>
           <a:p>
             <a:r>
               <a:rPr lang="en-US" dirty="0"/>
-              <a:t>AWS service which allows us to use Infrastructure-as-Code techniques to define infrastructure resources.</a:t>
+              <a:t>AWS provides two different ways to refer to S3 locations:</a:t>
             </a:r>
           </a:p>
           <a:p>
             <a:pPr lvl="1"/>
             <a:r>
               <a:rPr lang="en-US" dirty="0"/>
-              <a:t>Basically build everything in AWS using code files.</a:t>
-            </a:r>
-          </a:p>
-          <a:p>
-            <a:pPr lvl="1"/>
+              <a:t>S3Uri</a:t>
+            </a:r>
+          </a:p>
+          <a:p>
+            <a:pPr lvl="2"/>
+            <a:r>
+              <a:rPr lang="en-US" dirty="0" err="1"/>
+              <a:t>aws</a:t>
+            </a:r>
             <a:r>
               <a:rPr lang="en-US" dirty="0"/>
-              <a:t>Infrastructure definition tool</a:t>
+              <a:t> s3 </a:t>
+            </a:r>
+            <a:r>
+              <a:rPr lang="en-US" dirty="0" err="1"/>
+              <a:t>cp</a:t>
+            </a:r>
+            <a:r>
+              <a:rPr lang="en-US" dirty="0"/>
+              <a:t> </a:t>
+            </a:r>
+            <a:r>
+              <a:rPr lang="en-US" dirty="0" err="1"/>
+              <a:t>test.txt</a:t>
+            </a:r>
+            <a:r>
+              <a:rPr lang="en-US" dirty="0"/>
+              <a:t> </a:t>
+            </a:r>
+            <a:r>
+              <a:rPr lang="en-US" b="1" dirty="0"/>
+              <a:t>s3://</a:t>
+            </a:r>
+            <a:r>
+              <a:rPr lang="en-US" b="1" dirty="0" err="1"/>
+              <a:t>mybucket</a:t>
+            </a:r>
+            <a:r>
+              <a:rPr lang="en-US" b="1" dirty="0"/>
+              <a:t>/test2.txt</a:t>
+            </a:r>
+          </a:p>
+          <a:p>
+            <a:pPr lvl="2"/>
+            <a:r>
+              <a:rPr lang="en-US" dirty="0"/>
+              <a:t>Note that the S3Uri doesn't contain any region information.</a:t>
+            </a:r>
+          </a:p>
+          <a:p>
+            <a:pPr lvl="2"/>
+            <a:r>
+              <a:rPr lang="en-US" dirty="0"/>
+              <a:t>Typically AWS API commands are looking for S3 objects formatted using an S3Uri.</a:t>
             </a:r>
           </a:p>
           <a:p>
@@ -3993,97 +4032,57 @@
             <a:endParaRPr lang="en-US" dirty="0"/>
           </a:p>
           <a:p>
+            <a:pPr lvl="1"/>
             <a:r>
               <a:rPr lang="en-US" dirty="0"/>
-              <a:t>CloudFormation creates resource stacks from templates.</a:t>
-            </a:r>
-          </a:p>
-          <a:p>
-            <a:pPr lvl="1"/>
+              <a:t>S3 URL (http)</a:t>
+            </a:r>
+          </a:p>
+          <a:p>
+            <a:pPr lvl="2"/>
             <a:r>
               <a:rPr lang="en-US" dirty="0"/>
-              <a:t>Resource stack is a group of resources defined by a template.</a:t>
-            </a:r>
-          </a:p>
-          <a:p>
-            <a:pPr lvl="1"/>
-            <a:r>
-              <a:rPr lang="en-US" dirty="0"/>
-              <a:t>Templates can live in S3 buckets.</a:t>
-            </a:r>
-          </a:p>
-          <a:p>
-            <a:pPr lvl="1"/>
-            <a:r>
-              <a:rPr lang="en-US" dirty="0"/>
-              <a:t>Create stacks using the CloudFormation web console.</a:t>
-            </a:r>
-          </a:p>
-          <a:p>
-            <a:pPr lvl="1"/>
-            <a:endParaRPr lang="en-US" dirty="0"/>
-          </a:p>
-          <a:p>
-            <a:r>
-              <a:rPr lang="en-US" dirty="0"/>
-              <a:t>Demonstration</a:t>
-            </a:r>
-          </a:p>
-          <a:p>
-            <a:pPr lvl="1"/>
-            <a:r>
-              <a:rPr lang="en-US" dirty="0"/>
-              <a:t>Launch a stack: </a:t>
-            </a:r>
+              <a:t>https://mybucket.s3-aws-region.amazonaws.com/test2.txt</a:t>
+            </a:r>
+          </a:p>
+          <a:p>
+            <a:pPr lvl="2"/>
             <a:r>
               <a:rPr lang="en-US" dirty="0">
                 <a:hlinkClick r:id="rId2"/>
               </a:rPr>
-              <a:t>https://s3.amazonaws.com/seis665/docker-single-server.json</a:t>
+              <a:t>https://s3-aws-region.amazonaws.com/bucket/test2.txt</a:t>
             </a:r>
             <a:endParaRPr lang="en-US" dirty="0"/>
           </a:p>
           <a:p>
+            <a:pPr lvl="2"/>
+            <a:r>
+              <a:rPr lang="en-US" dirty="0"/>
+              <a:t>Typically used when downloading a file </a:t>
+            </a:r>
+          </a:p>
+          <a:p>
+            <a:pPr lvl="2"/>
+            <a:endParaRPr lang="en-US" dirty="0"/>
+          </a:p>
+          <a:p>
             <a:pPr lvl="1"/>
             <a:r>
               <a:rPr lang="en-US" dirty="0"/>
-              <a:t>Review the launch events</a:t>
-            </a:r>
-          </a:p>
-          <a:p>
-            <a:pPr lvl="1"/>
-            <a:r>
-              <a:rPr lang="en-US" dirty="0"/>
-              <a:t>Review </a:t>
-            </a:r>
-            <a:r>
-              <a:rPr lang="en-US"/>
-              <a:t>the stack outputs</a:t>
-            </a:r>
+              <a:t>You generally cannot interchange these formats!</a:t>
+            </a:r>
+          </a:p>
+          <a:p>
+            <a:pPr lvl="2"/>
             <a:endParaRPr lang="en-US" dirty="0"/>
-          </a:p>
-          <a:p>
-            <a:pPr lvl="1"/>
-            <a:r>
-              <a:rPr lang="en-US" dirty="0"/>
-              <a:t>Delete the stack</a:t>
-            </a:r>
-          </a:p>
-          <a:p>
-            <a:endParaRPr lang="en-US" dirty="0"/>
-          </a:p>
-          <a:p>
-            <a:r>
-              <a:rPr lang="en-US" dirty="0"/>
-              <a:t>We will learn much more about CloudFormation later in the course!</a:t>
-            </a:r>
           </a:p>
         </p:txBody>
       </p:sp>
     </p:spTree>
     <p:extLst>
       <p:ext uri="{BB962C8B-B14F-4D97-AF65-F5344CB8AC3E}">
-        <p14:creationId xmlns:p14="http://schemas.microsoft.com/office/powerpoint/2010/main" val="2129477334"/>
+        <p14:creationId xmlns:p14="http://schemas.microsoft.com/office/powerpoint/2010/main" val="612815201"/>
       </p:ext>
     </p:extLst>
   </p:cSld>
@@ -4112,13 +4111,7 @@
       </p:grpSpPr>
       <p:sp>
         <p:nvSpPr>
-          <p:cNvPr id="2" name="Title 1">
-            <a:extLst>
-              <a:ext uri="{FF2B5EF4-FFF2-40B4-BE49-F238E27FC236}">
-                <a16:creationId xmlns:a16="http://schemas.microsoft.com/office/drawing/2014/main" id="{6FF27851-F3E4-754E-A39D-B0BB9A3EF0DD}"/>
-              </a:ext>
-            </a:extLst>
-          </p:cNvPr>
+          <p:cNvPr id="2" name="Title 1"/>
           <p:cNvSpPr>
             <a:spLocks noGrp="1"/>
           </p:cNvSpPr>
@@ -4133,20 +4126,14 @@
           <a:p>
             <a:r>
               <a:rPr lang="en-US" dirty="0"/>
-              <a:t>Understanding S3 addresses</a:t>
-            </a:r>
-          </a:p>
-        </p:txBody>
-      </p:sp>
-      <p:sp>
-        <p:nvSpPr>
-          <p:cNvPr id="3" name="Content Placeholder 2">
-            <a:extLst>
-              <a:ext uri="{FF2B5EF4-FFF2-40B4-BE49-F238E27FC236}">
-                <a16:creationId xmlns:a16="http://schemas.microsoft.com/office/drawing/2014/main" id="{EC802898-5B8C-C44B-9BC8-2BDAA6BA2C01}"/>
-              </a:ext>
-            </a:extLst>
-          </p:cNvPr>
+              <a:t>Homework</a:t>
+            </a:r>
+          </a:p>
+        </p:txBody>
+      </p:sp>
+      <p:sp>
+        <p:nvSpPr>
+          <p:cNvPr id="3" name="Content Placeholder 2"/>
           <p:cNvSpPr>
             <a:spLocks noGrp="1"/>
           </p:cNvSpPr>
@@ -4156,124 +4143,28 @@
         </p:nvSpPr>
         <p:spPr/>
         <p:txBody>
-          <a:bodyPr>
-            <a:normAutofit lnSpcReduction="10000"/>
-          </a:bodyPr>
+          <a:bodyPr/>
           <a:lstStyle/>
           <a:p>
             <a:r>
               <a:rPr lang="en-US" dirty="0"/>
-              <a:t>AWS provides two different ways to refer to S3 locations:</a:t>
-            </a:r>
-          </a:p>
-          <a:p>
-            <a:pPr lvl="1"/>
+              <a:t>Assignment 5: Autoscaling</a:t>
+            </a:r>
+          </a:p>
+          <a:p>
+            <a:r>
+              <a:rPr lang="en-US"/>
+              <a:t>Watch </a:t>
+            </a:r>
             <a:r>
               <a:rPr lang="en-US" dirty="0"/>
-              <a:t>S3Uri</a:t>
-            </a:r>
-          </a:p>
-          <a:p>
-            <a:pPr lvl="2"/>
-            <a:r>
-              <a:rPr lang="en-US" dirty="0" err="1"/>
-              <a:t>aws</a:t>
-            </a:r>
-            <a:r>
-              <a:rPr lang="en-US" dirty="0"/>
-              <a:t> s3 </a:t>
-            </a:r>
-            <a:r>
-              <a:rPr lang="en-US" dirty="0" err="1"/>
-              <a:t>cp</a:t>
-            </a:r>
-            <a:r>
-              <a:rPr lang="en-US" dirty="0"/>
-              <a:t> </a:t>
-            </a:r>
-            <a:r>
-              <a:rPr lang="en-US" dirty="0" err="1"/>
-              <a:t>test.txt</a:t>
-            </a:r>
-            <a:r>
-              <a:rPr lang="en-US" dirty="0"/>
-              <a:t> </a:t>
-            </a:r>
-            <a:r>
-              <a:rPr lang="en-US" b="1" dirty="0"/>
-              <a:t>s3://</a:t>
-            </a:r>
-            <a:r>
-              <a:rPr lang="en-US" b="1" dirty="0" err="1"/>
-              <a:t>mybucket</a:t>
-            </a:r>
-            <a:r>
-              <a:rPr lang="en-US" b="1" dirty="0"/>
-              <a:t>/test2.txt</a:t>
-            </a:r>
-          </a:p>
-          <a:p>
-            <a:pPr lvl="2"/>
-            <a:r>
-              <a:rPr lang="en-US" dirty="0"/>
-              <a:t>Note that the S3Uri doesn't contain any region information.</a:t>
-            </a:r>
-          </a:p>
-          <a:p>
-            <a:pPr lvl="2"/>
-            <a:r>
-              <a:rPr lang="en-US" dirty="0"/>
-              <a:t>Typically AWS API commands are looking for S3 objects formatted using an S3Uri.</a:t>
-            </a:r>
-          </a:p>
-          <a:p>
-            <a:pPr lvl="1"/>
-            <a:endParaRPr lang="en-US" dirty="0"/>
-          </a:p>
-          <a:p>
-            <a:pPr lvl="1"/>
-            <a:r>
-              <a:rPr lang="en-US" dirty="0"/>
-              <a:t>S3 URL (http)</a:t>
-            </a:r>
-          </a:p>
-          <a:p>
-            <a:pPr lvl="2"/>
-            <a:r>
-              <a:rPr lang="en-US" dirty="0"/>
-              <a:t>https://mybucket.s3-aws-region.amazonaws.com/test2.txt</a:t>
-            </a:r>
-          </a:p>
-          <a:p>
-            <a:pPr lvl="2"/>
-            <a:r>
-              <a:rPr lang="en-US" dirty="0">
-                <a:hlinkClick r:id="rId2"/>
-              </a:rPr>
-              <a:t>https://s3-aws-region.amazonaws.com/bucket/test2.txt</a:t>
-            </a:r>
-            <a:endParaRPr lang="en-US" dirty="0"/>
-          </a:p>
-          <a:p>
-            <a:pPr lvl="2"/>
-            <a:r>
-              <a:rPr lang="en-US" dirty="0"/>
-              <a:t>Typically used when downloading a file </a:t>
-            </a:r>
-          </a:p>
-          <a:p>
-            <a:pPr lvl="2"/>
-            <a:endParaRPr lang="en-US" dirty="0"/>
-          </a:p>
-          <a:p>
-            <a:pPr lvl="1"/>
-            <a:r>
-              <a:rPr lang="en-US" dirty="0"/>
-              <a:t>You generally cannot interchange these formats!</a:t>
-            </a:r>
-          </a:p>
-          <a:p>
-            <a:pPr lvl="2"/>
+              <a:t>Lecture 6 videos</a:t>
+            </a:r>
+          </a:p>
+          <a:p>
+            <a:pPr marL="457200" lvl="1" indent="0">
+              <a:buNone/>
+            </a:pPr>
             <a:endParaRPr lang="en-US" dirty="0"/>
           </a:p>
         </p:txBody>
@@ -4281,7 +4172,7 @@
     </p:spTree>
     <p:extLst>
       <p:ext uri="{BB962C8B-B14F-4D97-AF65-F5344CB8AC3E}">
-        <p14:creationId xmlns:p14="http://schemas.microsoft.com/office/powerpoint/2010/main" val="612815201"/>
+        <p14:creationId xmlns:p14="http://schemas.microsoft.com/office/powerpoint/2010/main" val="855358465"/>
       </p:ext>
     </p:extLst>
   </p:cSld>
@@ -4359,6 +4250,15 @@
           <a:p>
             <a:r>
               <a:rPr lang="en-US" dirty="0"/>
+              <a:t>Attendance</a:t>
+            </a:r>
+          </a:p>
+          <a:p>
+            <a:endParaRPr lang="en-US" dirty="0"/>
+          </a:p>
+          <a:p>
+            <a:r>
+              <a:rPr lang="en-US" dirty="0"/>
               <a:t>Overview: </a:t>
             </a:r>
           </a:p>
@@ -4366,32 +4266,16 @@
             <a:pPr lvl="1"/>
             <a:r>
               <a:rPr lang="en-US" dirty="0"/>
-              <a:t>Practice launching a CloudFormation stack. </a:t>
-            </a:r>
-          </a:p>
-          <a:p>
-            <a:pPr lvl="1"/>
-            <a:r>
-              <a:rPr lang="en-US" dirty="0"/>
-              <a:t>Build an infrastructure architecture which implements an EC2 </a:t>
-            </a:r>
-            <a:r>
-              <a:rPr lang="en-US" dirty="0" err="1"/>
-              <a:t>autoscaling</a:t>
-            </a:r>
-            <a:r>
-              <a:rPr lang="en-US" dirty="0"/>
-              <a:t> group and </a:t>
+              <a:t>Build an infrastructure architecture which implements an EC2 autoscaling group and </a:t>
             </a:r>
             <a:r>
               <a:rPr lang="en-US" dirty="0" err="1"/>
               <a:t>ElastiCache</a:t>
             </a:r>
             <a:r>
-              <a:rPr lang="en-US"/>
+              <a:rPr lang="en-US" dirty="0"/>
               <a:t> cluster.</a:t>
             </a:r>
-            <a:endParaRPr lang="en-US" dirty="0"/>
           </a:p>
           <a:p>
             <a:endParaRPr lang="en-US" dirty="0"/>
@@ -4408,96 +4292,6 @@
     <p:extLst>
       <p:ext uri="{BB962C8B-B14F-4D97-AF65-F5344CB8AC3E}">
         <p14:creationId xmlns:p14="http://schemas.microsoft.com/office/powerpoint/2010/main" val="834361289"/>
-      </p:ext>
-    </p:extLst>
-  </p:cSld>
-  <p:clrMapOvr>
-    <a:masterClrMapping/>
-  </p:clrMapOvr>
-</p:sld>
-</file>
-
-<file path=ppt/slides/slide8.xml><?xml version="1.0" encoding="utf-8"?>
-<p:sld xmlns:a="http://schemas.openxmlformats.org/drawingml/2006/main" xmlns:r="http://schemas.openxmlformats.org/officeDocument/2006/relationships" xmlns:p="http://schemas.openxmlformats.org/presentationml/2006/main">
-  <p:cSld>
-    <p:spTree>
-      <p:nvGrpSpPr>
-        <p:cNvPr id="1" name=""/>
-        <p:cNvGrpSpPr/>
-        <p:nvPr/>
-      </p:nvGrpSpPr>
-      <p:grpSpPr>
-        <a:xfrm>
-          <a:off x="0" y="0"/>
-          <a:ext cx="0" cy="0"/>
-          <a:chOff x="0" y="0"/>
-          <a:chExt cx="0" cy="0"/>
-        </a:xfrm>
-      </p:grpSpPr>
-      <p:sp>
-        <p:nvSpPr>
-          <p:cNvPr id="2" name="Title 1"/>
-          <p:cNvSpPr>
-            <a:spLocks noGrp="1"/>
-          </p:cNvSpPr>
-          <p:nvPr>
-            <p:ph type="title"/>
-          </p:nvPr>
-        </p:nvSpPr>
-        <p:spPr/>
-        <p:txBody>
-          <a:bodyPr/>
-          <a:lstStyle/>
-          <a:p>
-            <a:r>
-              <a:rPr lang="en-US" dirty="0"/>
-              <a:t>Homework</a:t>
-            </a:r>
-          </a:p>
-        </p:txBody>
-      </p:sp>
-      <p:sp>
-        <p:nvSpPr>
-          <p:cNvPr id="3" name="Content Placeholder 2"/>
-          <p:cNvSpPr>
-            <a:spLocks noGrp="1"/>
-          </p:cNvSpPr>
-          <p:nvPr>
-            <p:ph idx="1"/>
-          </p:nvPr>
-        </p:nvSpPr>
-        <p:spPr/>
-        <p:txBody>
-          <a:bodyPr/>
-          <a:lstStyle/>
-          <a:p>
-            <a:r>
-              <a:rPr lang="en-US" dirty="0"/>
-              <a:t>Assignment 5: Autoscaling</a:t>
-            </a:r>
-          </a:p>
-          <a:p>
-            <a:r>
-              <a:rPr lang="en-US"/>
-              <a:t>Watch </a:t>
-            </a:r>
-            <a:r>
-              <a:rPr lang="en-US" dirty="0"/>
-              <a:t>Lecture 6 videos</a:t>
-            </a:r>
-          </a:p>
-          <a:p>
-            <a:pPr marL="457200" lvl="1" indent="0">
-              <a:buNone/>
-            </a:pPr>
-            <a:endParaRPr lang="en-US" dirty="0"/>
-          </a:p>
-        </p:txBody>
-      </p:sp>
-    </p:spTree>
-    <p:extLst>
-      <p:ext uri="{BB962C8B-B14F-4D97-AF65-F5344CB8AC3E}">
-        <p14:creationId xmlns:p14="http://schemas.microsoft.com/office/powerpoint/2010/main" val="855358465"/>
       </p:ext>
     </p:extLst>
   </p:cSld>

</xml_diff>